<commit_message>
course introduction for 2019-spring semester
</commit_message>
<xml_diff>
--- a/lectures/lec00-course_intro/lec00-unix_course_intro.pptx
+++ b/lectures/lec00-course_intro/lec00-unix_course_intro.pptx
@@ -361,7 +361,7 @@
                 <a:pPr eaLnBrk="1" hangingPunct="1">
                   <a:defRPr/>
                 </a:pPr>
-                <a:endParaRPr lang="zh-TW" altLang="en-US" smtClean="0"/>
+                <a:endParaRPr lang="zh-TW" altLang="en-US"/>
               </a:p>
             </p:txBody>
           </p:sp>
@@ -521,7 +521,7 @@
                 <a:pPr eaLnBrk="1" hangingPunct="1">
                   <a:defRPr/>
                 </a:pPr>
-                <a:endParaRPr lang="zh-TW" altLang="en-US" smtClean="0"/>
+                <a:endParaRPr lang="zh-TW" altLang="en-US"/>
               </a:p>
             </p:txBody>
           </p:sp>
@@ -690,7 +690,7 @@
                 <a:pPr eaLnBrk="1" hangingPunct="1">
                   <a:defRPr/>
                 </a:pPr>
-                <a:endParaRPr lang="zh-TW" altLang="en-US" smtClean="0"/>
+                <a:endParaRPr lang="zh-TW" altLang="en-US"/>
               </a:p>
             </p:txBody>
           </p:sp>
@@ -850,7 +850,7 @@
                 <a:pPr eaLnBrk="1" hangingPunct="1">
                   <a:defRPr/>
                 </a:pPr>
-                <a:endParaRPr lang="zh-TW" altLang="en-US" smtClean="0"/>
+                <a:endParaRPr lang="zh-TW" altLang="en-US"/>
               </a:p>
             </p:txBody>
           </p:sp>
@@ -1011,7 +1011,7 @@
               <a:pPr eaLnBrk="1" hangingPunct="1">
                 <a:defRPr/>
               </a:pPr>
-              <a:endParaRPr lang="zh-TW" altLang="en-US" smtClean="0"/>
+              <a:endParaRPr lang="zh-TW" altLang="en-US"/>
             </a:p>
           </p:txBody>
         </p:sp>
@@ -1163,7 +1163,7 @@
               <a:pPr eaLnBrk="1" hangingPunct="1">
                 <a:defRPr/>
               </a:pPr>
-              <a:endParaRPr lang="zh-TW" altLang="en-US" smtClean="0"/>
+              <a:endParaRPr lang="zh-TW" altLang="en-US"/>
             </a:p>
           </p:txBody>
         </p:sp>
@@ -1323,7 +1323,7 @@
               <a:pPr eaLnBrk="1" hangingPunct="1">
                 <a:defRPr/>
               </a:pPr>
-              <a:endParaRPr lang="zh-TW" altLang="en-US" smtClean="0"/>
+              <a:endParaRPr lang="zh-TW" altLang="en-US"/>
             </a:p>
           </p:txBody>
         </p:sp>
@@ -1550,10 +1550,9 @@
           <a:lstStyle/>
           <a:p>
             <a:r>
-              <a:rPr lang="zh-TW" altLang="en-US" smtClean="0"/>
+              <a:rPr lang="zh-TW" altLang="en-US"/>
               <a:t>按一下以編輯母片標題樣式</a:t>
             </a:r>
-            <a:endParaRPr lang="zh-TW" altLang="en-US"/>
           </a:p>
         </p:txBody>
       </p:sp>
@@ -1574,38 +1573,37 @@
           <a:p>
             <a:pPr lvl="0"/>
             <a:r>
-              <a:rPr lang="zh-TW" altLang="en-US" smtClean="0"/>
+              <a:rPr lang="zh-TW" altLang="en-US"/>
               <a:t>按一下以編輯母片文字樣式</a:t>
             </a:r>
           </a:p>
           <a:p>
             <a:pPr lvl="1"/>
             <a:r>
-              <a:rPr lang="zh-TW" altLang="en-US" smtClean="0"/>
+              <a:rPr lang="zh-TW" altLang="en-US"/>
               <a:t>第二層</a:t>
             </a:r>
           </a:p>
           <a:p>
             <a:pPr lvl="2"/>
             <a:r>
-              <a:rPr lang="zh-TW" altLang="en-US" smtClean="0"/>
+              <a:rPr lang="zh-TW" altLang="en-US"/>
               <a:t>第三層</a:t>
             </a:r>
           </a:p>
           <a:p>
             <a:pPr lvl="3"/>
             <a:r>
-              <a:rPr lang="zh-TW" altLang="en-US" smtClean="0"/>
+              <a:rPr lang="zh-TW" altLang="en-US"/>
               <a:t>第四層</a:t>
             </a:r>
           </a:p>
           <a:p>
             <a:pPr lvl="4"/>
             <a:r>
-              <a:rPr lang="zh-TW" altLang="en-US" smtClean="0"/>
+              <a:rPr lang="zh-TW" altLang="en-US"/>
               <a:t>第五層</a:t>
             </a:r>
-            <a:endParaRPr lang="zh-TW" altLang="en-US"/>
           </a:p>
         </p:txBody>
       </p:sp>
@@ -1751,10 +1749,9 @@
           <a:lstStyle/>
           <a:p>
             <a:r>
-              <a:rPr lang="zh-TW" altLang="en-US" smtClean="0"/>
+              <a:rPr lang="zh-TW" altLang="en-US"/>
               <a:t>按一下以編輯母片標題樣式</a:t>
             </a:r>
-            <a:endParaRPr lang="zh-TW" altLang="en-US"/>
           </a:p>
         </p:txBody>
       </p:sp>
@@ -1780,38 +1777,37 @@
           <a:p>
             <a:pPr lvl="0"/>
             <a:r>
-              <a:rPr lang="zh-TW" altLang="en-US" smtClean="0"/>
+              <a:rPr lang="zh-TW" altLang="en-US"/>
               <a:t>按一下以編輯母片文字樣式</a:t>
             </a:r>
           </a:p>
           <a:p>
             <a:pPr lvl="1"/>
             <a:r>
-              <a:rPr lang="zh-TW" altLang="en-US" smtClean="0"/>
+              <a:rPr lang="zh-TW" altLang="en-US"/>
               <a:t>第二層</a:t>
             </a:r>
           </a:p>
           <a:p>
             <a:pPr lvl="2"/>
             <a:r>
-              <a:rPr lang="zh-TW" altLang="en-US" smtClean="0"/>
+              <a:rPr lang="zh-TW" altLang="en-US"/>
               <a:t>第三層</a:t>
             </a:r>
           </a:p>
           <a:p>
             <a:pPr lvl="3"/>
             <a:r>
-              <a:rPr lang="zh-TW" altLang="en-US" smtClean="0"/>
+              <a:rPr lang="zh-TW" altLang="en-US"/>
               <a:t>第四層</a:t>
             </a:r>
           </a:p>
           <a:p>
             <a:pPr lvl="4"/>
             <a:r>
-              <a:rPr lang="zh-TW" altLang="en-US" smtClean="0"/>
+              <a:rPr lang="zh-TW" altLang="en-US"/>
               <a:t>第五層</a:t>
             </a:r>
-            <a:endParaRPr lang="zh-TW" altLang="en-US"/>
           </a:p>
         </p:txBody>
       </p:sp>
@@ -1952,10 +1948,9 @@
           <a:lstStyle/>
           <a:p>
             <a:r>
-              <a:rPr lang="zh-TW" altLang="en-US" smtClean="0"/>
+              <a:rPr lang="zh-TW" altLang="en-US"/>
               <a:t>按一下以編輯母片標題樣式</a:t>
             </a:r>
-            <a:endParaRPr lang="zh-TW" altLang="en-US"/>
           </a:p>
         </p:txBody>
       </p:sp>
@@ -1976,38 +1971,37 @@
           <a:p>
             <a:pPr lvl="0"/>
             <a:r>
-              <a:rPr lang="zh-TW" altLang="en-US" smtClean="0"/>
+              <a:rPr lang="zh-TW" altLang="en-US"/>
               <a:t>按一下以編輯母片文字樣式</a:t>
             </a:r>
           </a:p>
           <a:p>
             <a:pPr lvl="1"/>
             <a:r>
-              <a:rPr lang="zh-TW" altLang="en-US" smtClean="0"/>
+              <a:rPr lang="zh-TW" altLang="en-US"/>
               <a:t>第二層</a:t>
             </a:r>
           </a:p>
           <a:p>
             <a:pPr lvl="2"/>
             <a:r>
-              <a:rPr lang="zh-TW" altLang="en-US" smtClean="0"/>
+              <a:rPr lang="zh-TW" altLang="en-US"/>
               <a:t>第三層</a:t>
             </a:r>
           </a:p>
           <a:p>
             <a:pPr lvl="3"/>
             <a:r>
-              <a:rPr lang="zh-TW" altLang="en-US" smtClean="0"/>
+              <a:rPr lang="zh-TW" altLang="en-US"/>
               <a:t>第四層</a:t>
             </a:r>
           </a:p>
           <a:p>
             <a:pPr lvl="4"/>
             <a:r>
-              <a:rPr lang="zh-TW" altLang="en-US" smtClean="0"/>
+              <a:rPr lang="zh-TW" altLang="en-US"/>
               <a:t>第五層</a:t>
             </a:r>
-            <a:endParaRPr lang="zh-TW" altLang="en-US"/>
           </a:p>
         </p:txBody>
       </p:sp>
@@ -2157,10 +2151,9 @@
           </a:lstStyle>
           <a:p>
             <a:r>
-              <a:rPr lang="zh-TW" altLang="en-US" smtClean="0"/>
+              <a:rPr lang="zh-TW" altLang="en-US"/>
               <a:t>按一下以編輯母片標題樣式</a:t>
             </a:r>
-            <a:endParaRPr lang="zh-TW" altLang="en-US"/>
           </a:p>
         </p:txBody>
       </p:sp>
@@ -2223,7 +2216,7 @@
           <a:p>
             <a:pPr lvl="0"/>
             <a:r>
-              <a:rPr lang="zh-TW" altLang="en-US" smtClean="0"/>
+              <a:rPr lang="zh-TW" altLang="en-US"/>
               <a:t>按一下以編輯母片文字樣式</a:t>
             </a:r>
           </a:p>
@@ -2366,10 +2359,9 @@
           <a:lstStyle/>
           <a:p>
             <a:r>
-              <a:rPr lang="zh-TW" altLang="en-US" smtClean="0"/>
+              <a:rPr lang="zh-TW" altLang="en-US"/>
               <a:t>按一下以編輯母片標題樣式</a:t>
             </a:r>
-            <a:endParaRPr lang="zh-TW" altLang="en-US"/>
           </a:p>
         </p:txBody>
       </p:sp>
@@ -2423,38 +2415,37 @@
           <a:p>
             <a:pPr lvl="0"/>
             <a:r>
-              <a:rPr lang="zh-TW" altLang="en-US" smtClean="0"/>
+              <a:rPr lang="zh-TW" altLang="en-US"/>
               <a:t>按一下以編輯母片文字樣式</a:t>
             </a:r>
           </a:p>
           <a:p>
             <a:pPr lvl="1"/>
             <a:r>
-              <a:rPr lang="zh-TW" altLang="en-US" smtClean="0"/>
+              <a:rPr lang="zh-TW" altLang="en-US"/>
               <a:t>第二層</a:t>
             </a:r>
           </a:p>
           <a:p>
             <a:pPr lvl="2"/>
             <a:r>
-              <a:rPr lang="zh-TW" altLang="en-US" smtClean="0"/>
+              <a:rPr lang="zh-TW" altLang="en-US"/>
               <a:t>第三層</a:t>
             </a:r>
           </a:p>
           <a:p>
             <a:pPr lvl="3"/>
             <a:r>
-              <a:rPr lang="zh-TW" altLang="en-US" smtClean="0"/>
+              <a:rPr lang="zh-TW" altLang="en-US"/>
               <a:t>第四層</a:t>
             </a:r>
           </a:p>
           <a:p>
             <a:pPr lvl="4"/>
             <a:r>
-              <a:rPr lang="zh-TW" altLang="en-US" smtClean="0"/>
+              <a:rPr lang="zh-TW" altLang="en-US"/>
               <a:t>第五層</a:t>
             </a:r>
-            <a:endParaRPr lang="zh-TW" altLang="en-US"/>
           </a:p>
         </p:txBody>
       </p:sp>
@@ -2508,38 +2499,37 @@
           <a:p>
             <a:pPr lvl="0"/>
             <a:r>
-              <a:rPr lang="zh-TW" altLang="en-US" smtClean="0"/>
+              <a:rPr lang="zh-TW" altLang="en-US"/>
               <a:t>按一下以編輯母片文字樣式</a:t>
             </a:r>
           </a:p>
           <a:p>
             <a:pPr lvl="1"/>
             <a:r>
-              <a:rPr lang="zh-TW" altLang="en-US" smtClean="0"/>
+              <a:rPr lang="zh-TW" altLang="en-US"/>
               <a:t>第二層</a:t>
             </a:r>
           </a:p>
           <a:p>
             <a:pPr lvl="2"/>
             <a:r>
-              <a:rPr lang="zh-TW" altLang="en-US" smtClean="0"/>
+              <a:rPr lang="zh-TW" altLang="en-US"/>
               <a:t>第三層</a:t>
             </a:r>
           </a:p>
           <a:p>
             <a:pPr lvl="3"/>
             <a:r>
-              <a:rPr lang="zh-TW" altLang="en-US" smtClean="0"/>
+              <a:rPr lang="zh-TW" altLang="en-US"/>
               <a:t>第四層</a:t>
             </a:r>
           </a:p>
           <a:p>
             <a:pPr lvl="4"/>
             <a:r>
-              <a:rPr lang="zh-TW" altLang="en-US" smtClean="0"/>
+              <a:rPr lang="zh-TW" altLang="en-US"/>
               <a:t>第五層</a:t>
             </a:r>
-            <a:endParaRPr lang="zh-TW" altLang="en-US"/>
           </a:p>
         </p:txBody>
       </p:sp>
@@ -2689,10 +2679,9 @@
           </a:lstStyle>
           <a:p>
             <a:r>
-              <a:rPr lang="zh-TW" altLang="en-US" smtClean="0"/>
+              <a:rPr lang="zh-TW" altLang="en-US"/>
               <a:t>按一下以編輯母片標題樣式</a:t>
             </a:r>
-            <a:endParaRPr lang="zh-TW" altLang="en-US"/>
           </a:p>
         </p:txBody>
       </p:sp>
@@ -2755,7 +2744,7 @@
           <a:p>
             <a:pPr lvl="0"/>
             <a:r>
-              <a:rPr lang="zh-TW" altLang="en-US" smtClean="0"/>
+              <a:rPr lang="zh-TW" altLang="en-US"/>
               <a:t>按一下以編輯母片文字樣式</a:t>
             </a:r>
           </a:p>
@@ -2811,38 +2800,37 @@
           <a:p>
             <a:pPr lvl="0"/>
             <a:r>
-              <a:rPr lang="zh-TW" altLang="en-US" smtClean="0"/>
+              <a:rPr lang="zh-TW" altLang="en-US"/>
               <a:t>按一下以編輯母片文字樣式</a:t>
             </a:r>
           </a:p>
           <a:p>
             <a:pPr lvl="1"/>
             <a:r>
-              <a:rPr lang="zh-TW" altLang="en-US" smtClean="0"/>
+              <a:rPr lang="zh-TW" altLang="en-US"/>
               <a:t>第二層</a:t>
             </a:r>
           </a:p>
           <a:p>
             <a:pPr lvl="2"/>
             <a:r>
-              <a:rPr lang="zh-TW" altLang="en-US" smtClean="0"/>
+              <a:rPr lang="zh-TW" altLang="en-US"/>
               <a:t>第三層</a:t>
             </a:r>
           </a:p>
           <a:p>
             <a:pPr lvl="3"/>
             <a:r>
-              <a:rPr lang="zh-TW" altLang="en-US" smtClean="0"/>
+              <a:rPr lang="zh-TW" altLang="en-US"/>
               <a:t>第四層</a:t>
             </a:r>
           </a:p>
           <a:p>
             <a:pPr lvl="4"/>
             <a:r>
-              <a:rPr lang="zh-TW" altLang="en-US" smtClean="0"/>
+              <a:rPr lang="zh-TW" altLang="en-US"/>
               <a:t>第五層</a:t>
             </a:r>
-            <a:endParaRPr lang="zh-TW" altLang="en-US"/>
           </a:p>
         </p:txBody>
       </p:sp>
@@ -2905,7 +2893,7 @@
           <a:p>
             <a:pPr lvl="0"/>
             <a:r>
-              <a:rPr lang="zh-TW" altLang="en-US" smtClean="0"/>
+              <a:rPr lang="zh-TW" altLang="en-US"/>
               <a:t>按一下以編輯母片文字樣式</a:t>
             </a:r>
           </a:p>
@@ -2961,38 +2949,37 @@
           <a:p>
             <a:pPr lvl="0"/>
             <a:r>
-              <a:rPr lang="zh-TW" altLang="en-US" smtClean="0"/>
+              <a:rPr lang="zh-TW" altLang="en-US"/>
               <a:t>按一下以編輯母片文字樣式</a:t>
             </a:r>
           </a:p>
           <a:p>
             <a:pPr lvl="1"/>
             <a:r>
-              <a:rPr lang="zh-TW" altLang="en-US" smtClean="0"/>
+              <a:rPr lang="zh-TW" altLang="en-US"/>
               <a:t>第二層</a:t>
             </a:r>
           </a:p>
           <a:p>
             <a:pPr lvl="2"/>
             <a:r>
-              <a:rPr lang="zh-TW" altLang="en-US" smtClean="0"/>
+              <a:rPr lang="zh-TW" altLang="en-US"/>
               <a:t>第三層</a:t>
             </a:r>
           </a:p>
           <a:p>
             <a:pPr lvl="3"/>
             <a:r>
-              <a:rPr lang="zh-TW" altLang="en-US" smtClean="0"/>
+              <a:rPr lang="zh-TW" altLang="en-US"/>
               <a:t>第四層</a:t>
             </a:r>
           </a:p>
           <a:p>
             <a:pPr lvl="4"/>
             <a:r>
-              <a:rPr lang="zh-TW" altLang="en-US" smtClean="0"/>
+              <a:rPr lang="zh-TW" altLang="en-US"/>
               <a:t>第五層</a:t>
             </a:r>
-            <a:endParaRPr lang="zh-TW" altLang="en-US"/>
           </a:p>
         </p:txBody>
       </p:sp>
@@ -3133,10 +3120,9 @@
           <a:lstStyle/>
           <a:p>
             <a:r>
-              <a:rPr lang="zh-TW" altLang="en-US" smtClean="0"/>
+              <a:rPr lang="zh-TW" altLang="en-US"/>
               <a:t>按一下以編輯母片標題樣式</a:t>
             </a:r>
-            <a:endParaRPr lang="zh-TW" altLang="en-US"/>
           </a:p>
         </p:txBody>
       </p:sp>
@@ -3407,10 +3393,9 @@
           </a:lstStyle>
           <a:p>
             <a:r>
-              <a:rPr lang="zh-TW" altLang="en-US" smtClean="0"/>
+              <a:rPr lang="zh-TW" altLang="en-US"/>
               <a:t>按一下以編輯母片標題樣式</a:t>
             </a:r>
-            <a:endParaRPr lang="zh-TW" altLang="en-US"/>
           </a:p>
         </p:txBody>
       </p:sp>
@@ -3464,38 +3449,37 @@
           <a:p>
             <a:pPr lvl="0"/>
             <a:r>
-              <a:rPr lang="zh-TW" altLang="en-US" smtClean="0"/>
+              <a:rPr lang="zh-TW" altLang="en-US"/>
               <a:t>按一下以編輯母片文字樣式</a:t>
             </a:r>
           </a:p>
           <a:p>
             <a:pPr lvl="1"/>
             <a:r>
-              <a:rPr lang="zh-TW" altLang="en-US" smtClean="0"/>
+              <a:rPr lang="zh-TW" altLang="en-US"/>
               <a:t>第二層</a:t>
             </a:r>
           </a:p>
           <a:p>
             <a:pPr lvl="2"/>
             <a:r>
-              <a:rPr lang="zh-TW" altLang="en-US" smtClean="0"/>
+              <a:rPr lang="zh-TW" altLang="en-US"/>
               <a:t>第三層</a:t>
             </a:r>
           </a:p>
           <a:p>
             <a:pPr lvl="3"/>
             <a:r>
-              <a:rPr lang="zh-TW" altLang="en-US" smtClean="0"/>
+              <a:rPr lang="zh-TW" altLang="en-US"/>
               <a:t>第四層</a:t>
             </a:r>
           </a:p>
           <a:p>
             <a:pPr lvl="4"/>
             <a:r>
-              <a:rPr lang="zh-TW" altLang="en-US" smtClean="0"/>
+              <a:rPr lang="zh-TW" altLang="en-US"/>
               <a:t>第五層</a:t>
             </a:r>
-            <a:endParaRPr lang="zh-TW" altLang="en-US"/>
           </a:p>
         </p:txBody>
       </p:sp>
@@ -3558,7 +3542,7 @@
           <a:p>
             <a:pPr lvl="0"/>
             <a:r>
-              <a:rPr lang="zh-TW" altLang="en-US" smtClean="0"/>
+              <a:rPr lang="zh-TW" altLang="en-US"/>
               <a:t>按一下以編輯母片文字樣式</a:t>
             </a:r>
           </a:p>
@@ -3710,10 +3694,9 @@
           </a:lstStyle>
           <a:p>
             <a:r>
-              <a:rPr lang="zh-TW" altLang="en-US" smtClean="0"/>
+              <a:rPr lang="zh-TW" altLang="en-US"/>
               <a:t>按一下以編輯母片標題樣式</a:t>
             </a:r>
-            <a:endParaRPr lang="zh-TW" altLang="en-US"/>
           </a:p>
         </p:txBody>
       </p:sp>
@@ -3775,7 +3758,7 @@
           </a:lstStyle>
           <a:p>
             <a:pPr lvl="0"/>
-            <a:endParaRPr lang="zh-TW" altLang="en-US" noProof="0" smtClean="0"/>
+            <a:endParaRPr lang="zh-TW" altLang="en-US" noProof="0"/>
           </a:p>
         </p:txBody>
       </p:sp>
@@ -3838,7 +3821,7 @@
           <a:p>
             <a:pPr lvl="0"/>
             <a:r>
-              <a:rPr lang="zh-TW" altLang="en-US" smtClean="0"/>
+              <a:rPr lang="zh-TW" altLang="en-US"/>
               <a:t>按一下以編輯母片文字樣式</a:t>
             </a:r>
           </a:p>
@@ -4121,7 +4104,7 @@
             <a:pPr algn="ctr" eaLnBrk="1" hangingPunct="1">
               <a:defRPr/>
             </a:pPr>
-            <a:endParaRPr lang="zh-TW" altLang="en-US" sz="2400" smtClean="0">
+            <a:endParaRPr lang="zh-TW" altLang="en-US" sz="2400">
               <a:latin typeface="Times New Roman" panose="02020603050405020304" pitchFamily="18" charset="0"/>
               <a:ea typeface="標楷體" panose="03000509000000000000" pitchFamily="65" charset="-120"/>
             </a:endParaRPr>
@@ -4284,7 +4267,7 @@
             <a:pPr algn="ctr" eaLnBrk="1" hangingPunct="1">
               <a:defRPr/>
             </a:pPr>
-            <a:endParaRPr lang="zh-TW" altLang="en-US" sz="2400" smtClean="0">
+            <a:endParaRPr lang="zh-TW" altLang="en-US" sz="2400">
               <a:latin typeface="Times New Roman" panose="02020603050405020304" pitchFamily="18" charset="0"/>
               <a:ea typeface="標楷體" panose="03000509000000000000" pitchFamily="65" charset="-120"/>
             </a:endParaRPr>
@@ -4439,7 +4422,7 @@
             <a:pPr algn="ctr" eaLnBrk="1" hangingPunct="1">
               <a:defRPr/>
             </a:pPr>
-            <a:endParaRPr lang="zh-TW" altLang="en-US" sz="2400" smtClean="0">
+            <a:endParaRPr lang="zh-TW" altLang="en-US" sz="2400">
               <a:latin typeface="Times New Roman" panose="02020603050405020304" pitchFamily="18" charset="0"/>
               <a:ea typeface="標楷體" panose="03000509000000000000" pitchFamily="65" charset="-120"/>
             </a:endParaRPr>
@@ -4602,7 +4585,7 @@
             <a:pPr algn="ctr" eaLnBrk="1" hangingPunct="1">
               <a:defRPr/>
             </a:pPr>
-            <a:endParaRPr lang="zh-TW" altLang="en-US" sz="2400" smtClean="0">
+            <a:endParaRPr lang="zh-TW" altLang="en-US" sz="2400">
               <a:latin typeface="Times New Roman" panose="02020603050405020304" pitchFamily="18" charset="0"/>
               <a:ea typeface="標楷體" panose="03000509000000000000" pitchFamily="65" charset="-120"/>
             </a:endParaRPr>
@@ -4765,7 +4748,7 @@
             <a:pPr algn="ctr" eaLnBrk="1" hangingPunct="1">
               <a:defRPr/>
             </a:pPr>
-            <a:endParaRPr lang="zh-TW" altLang="en-US" sz="2400" smtClean="0">
+            <a:endParaRPr lang="zh-TW" altLang="en-US" sz="2400">
               <a:latin typeface="Times New Roman" panose="02020603050405020304" pitchFamily="18" charset="0"/>
               <a:ea typeface="標楷體" panose="03000509000000000000" pitchFamily="65" charset="-120"/>
             </a:endParaRPr>
@@ -4920,7 +4903,7 @@
             <a:pPr algn="ctr" eaLnBrk="1" hangingPunct="1">
               <a:defRPr/>
             </a:pPr>
-            <a:endParaRPr lang="zh-TW" altLang="en-US" sz="2400" smtClean="0">
+            <a:endParaRPr lang="zh-TW" altLang="en-US" sz="2400">
               <a:latin typeface="Times New Roman" panose="02020603050405020304" pitchFamily="18" charset="0"/>
               <a:ea typeface="標楷體" panose="03000509000000000000" pitchFamily="65" charset="-120"/>
             </a:endParaRPr>
@@ -5083,7 +5066,7 @@
             <a:pPr algn="ctr" eaLnBrk="1" hangingPunct="1">
               <a:defRPr/>
             </a:pPr>
-            <a:endParaRPr lang="zh-TW" altLang="en-US" sz="2400" smtClean="0">
+            <a:endParaRPr lang="zh-TW" altLang="en-US" sz="2400">
               <a:latin typeface="Times New Roman" panose="02020603050405020304" pitchFamily="18" charset="0"/>
               <a:ea typeface="標楷體" panose="03000509000000000000" pitchFamily="65" charset="-120"/>
             </a:endParaRPr>
@@ -5142,7 +5125,7 @@
           <a:p>
             <a:pPr lvl="0"/>
             <a:r>
-              <a:rPr lang="zh-TW" altLang="en-US" smtClean="0"/>
+              <a:rPr lang="zh-TW" altLang="en-US"/>
               <a:t>按一下以編輯母片標題樣式</a:t>
             </a:r>
           </a:p>
@@ -5200,35 +5183,35 @@
           <a:p>
             <a:pPr lvl="0"/>
             <a:r>
-              <a:rPr lang="zh-TW" altLang="en-US" smtClean="0"/>
+              <a:rPr lang="zh-TW" altLang="en-US"/>
               <a:t>按一下以編輯母片</a:t>
             </a:r>
           </a:p>
           <a:p>
             <a:pPr lvl="1"/>
             <a:r>
-              <a:rPr lang="zh-TW" altLang="en-US" smtClean="0"/>
+              <a:rPr lang="zh-TW" altLang="en-US"/>
               <a:t>第二層</a:t>
             </a:r>
           </a:p>
           <a:p>
             <a:pPr lvl="2"/>
             <a:r>
-              <a:rPr lang="zh-TW" altLang="en-US" smtClean="0"/>
+              <a:rPr lang="zh-TW" altLang="en-US"/>
               <a:t>第三層</a:t>
             </a:r>
           </a:p>
           <a:p>
             <a:pPr lvl="3"/>
             <a:r>
-              <a:rPr lang="zh-TW" altLang="en-US" smtClean="0"/>
+              <a:rPr lang="zh-TW" altLang="en-US"/>
               <a:t>第四層</a:t>
             </a:r>
           </a:p>
           <a:p>
             <a:pPr lvl="4"/>
             <a:r>
-              <a:rPr lang="zh-TW" altLang="en-US" smtClean="0"/>
+              <a:rPr lang="zh-TW" altLang="en-US"/>
               <a:t>第五層</a:t>
             </a:r>
           </a:p>
@@ -5868,7 +5851,7 @@
           <a:p>
             <a:pPr eaLnBrk="1" hangingPunct="1"/>
             <a:r>
-              <a:rPr lang="en-US" altLang="zh-TW" smtClean="0"/>
+              <a:rPr lang="en-US" altLang="zh-TW"/>
               <a:t>UNIX Programming</a:t>
             </a:r>
           </a:p>
@@ -5891,36 +5874,36 @@
           <a:p>
             <a:pPr algn="r" eaLnBrk="1" hangingPunct="1"/>
             <a:r>
-              <a:rPr lang="en-US" altLang="zh-TW" smtClean="0"/>
+              <a:rPr lang="en-US" altLang="zh-TW"/>
               <a:t>Instructor: Yung-Cheng Ma (</a:t>
             </a:r>
             <a:r>
-              <a:rPr lang="zh-TW" altLang="en-US" smtClean="0"/>
+              <a:rPr lang="zh-TW" altLang="en-US"/>
               <a:t>馬詠程</a:t>
             </a:r>
             <a:r>
-              <a:rPr lang="en-US" altLang="zh-TW" smtClean="0"/>
+              <a:rPr lang="en-US" altLang="zh-TW"/>
               <a:t>)</a:t>
             </a:r>
           </a:p>
           <a:p>
             <a:pPr algn="r" eaLnBrk="1" hangingPunct="1"/>
             <a:r>
-              <a:rPr lang="en-US" altLang="zh-TW" smtClean="0"/>
+              <a:rPr lang="en-US" altLang="zh-TW"/>
               <a:t>E-Mail: </a:t>
             </a:r>
             <a:r>
-              <a:rPr lang="en-US" altLang="zh-TW" smtClean="0">
+              <a:rPr lang="en-US" altLang="zh-TW">
                 <a:hlinkClick r:id="rId2"/>
               </a:rPr>
               <a:t>ycma@mail.cgu.edu.tw</a:t>
             </a:r>
-            <a:endParaRPr lang="en-US" altLang="zh-TW" smtClean="0"/>
+            <a:endParaRPr lang="en-US" altLang="zh-TW"/>
           </a:p>
           <a:p>
             <a:pPr algn="r" eaLnBrk="1" hangingPunct="1"/>
             <a:r>
-              <a:rPr lang="en-US" altLang="zh-TW" smtClean="0"/>
+              <a:rPr lang="en-US" altLang="zh-TW"/>
               <a:t>Tel: 3611</a:t>
             </a:r>
           </a:p>
@@ -6171,13 +6154,6 @@
   <p:clrMapOvr>
     <a:masterClrMapping/>
   </p:clrMapOvr>
-  <p:timing>
-    <p:tnLst>
-      <p:par>
-        <p:cTn id="1" dur="indefinite" restart="never" nodeType="tmRoot"/>
-      </p:par>
-    </p:tnLst>
-  </p:timing>
 </p:sld>
 </file>
 
@@ -6215,7 +6191,7 @@
           <a:p>
             <a:pPr eaLnBrk="1" hangingPunct="1"/>
             <a:r>
-              <a:rPr lang="en-US" altLang="zh-TW" smtClean="0"/>
+              <a:rPr lang="en-US" altLang="zh-TW"/>
               <a:t>First-thing to do</a:t>
             </a:r>
           </a:p>
@@ -6242,7 +6218,7 @@
               </a:lnSpc>
             </a:pPr>
             <a:r>
-              <a:rPr lang="en-US" altLang="zh-TW" sz="2800" dirty="0" smtClean="0"/>
+              <a:rPr lang="en-US" altLang="zh-TW" sz="2800" dirty="0"/>
               <a:t>setup your Linux</a:t>
             </a:r>
           </a:p>
@@ -6253,7 +6229,7 @@
               </a:lnSpc>
             </a:pPr>
             <a:r>
-              <a:rPr lang="en-US" altLang="zh-TW" sz="2400" dirty="0" smtClean="0"/>
+              <a:rPr lang="en-US" altLang="zh-TW" sz="2400" dirty="0"/>
               <a:t>use the embedded system LAB (dual-boot w/ Fedora)</a:t>
             </a:r>
           </a:p>
@@ -6264,7 +6240,7 @@
               </a:lnSpc>
             </a:pPr>
             <a:r>
-              <a:rPr lang="en-US" altLang="zh-TW" sz="2400" dirty="0" smtClean="0"/>
+              <a:rPr lang="en-US" altLang="zh-TW" sz="2400" dirty="0"/>
               <a:t>use your own computer</a:t>
             </a:r>
           </a:p>
@@ -6275,7 +6251,7 @@
               </a:lnSpc>
             </a:pPr>
             <a:r>
-              <a:rPr lang="en-US" altLang="zh-TW" sz="2000" dirty="0" smtClean="0"/>
+              <a:rPr lang="en-US" altLang="zh-TW" sz="2000" dirty="0"/>
               <a:t>most of Linux distribution (e.g. Fedora 9+) supports dual-boot</a:t>
             </a:r>
           </a:p>
@@ -6286,7 +6262,7 @@
               </a:lnSpc>
             </a:pPr>
             <a:r>
-              <a:rPr lang="en-US" altLang="zh-TW" sz="2000" dirty="0" smtClean="0"/>
+              <a:rPr lang="en-US" altLang="zh-TW" sz="2000" dirty="0"/>
               <a:t>you can still have your M$-Windows with Linux</a:t>
             </a:r>
           </a:p>
@@ -6297,7 +6273,7 @@
               </a:lnSpc>
             </a:pPr>
             <a:r>
-              <a:rPr lang="en-US" altLang="zh-TW" sz="2800" dirty="0" smtClean="0"/>
+              <a:rPr lang="en-US" altLang="zh-TW" sz="2800" dirty="0"/>
               <a:t>test the following software works</a:t>
             </a:r>
           </a:p>
@@ -6308,15 +6284,15 @@
               </a:lnSpc>
             </a:pPr>
             <a:r>
-              <a:rPr lang="en-US" altLang="zh-TW" sz="2400" dirty="0" smtClean="0"/>
+              <a:rPr lang="en-US" altLang="zh-TW" sz="2400" dirty="0"/>
               <a:t>shells: bash, </a:t>
             </a:r>
             <a:r>
-              <a:rPr lang="en-US" altLang="zh-TW" sz="2400" dirty="0" err="1" smtClean="0"/>
+              <a:rPr lang="en-US" altLang="zh-TW" sz="2400" dirty="0" err="1"/>
               <a:t>tcsh</a:t>
             </a:r>
             <a:r>
-              <a:rPr lang="en-US" altLang="zh-TW" sz="2400" dirty="0" smtClean="0"/>
+              <a:rPr lang="en-US" altLang="zh-TW" sz="2400" dirty="0"/>
               <a:t>, etc.</a:t>
             </a:r>
           </a:p>
@@ -6327,23 +6303,23 @@
               </a:lnSpc>
             </a:pPr>
             <a:r>
-              <a:rPr lang="en-US" altLang="zh-TW" sz="2400" dirty="0" smtClean="0"/>
+              <a:rPr lang="en-US" altLang="zh-TW" sz="2400" dirty="0"/>
               <a:t>programming tools: </a:t>
             </a:r>
             <a:r>
-              <a:rPr lang="en-US" altLang="zh-TW" sz="2400" dirty="0" err="1" smtClean="0"/>
+              <a:rPr lang="en-US" altLang="zh-TW" sz="2400" dirty="0" err="1"/>
               <a:t>gcc</a:t>
             </a:r>
             <a:r>
-              <a:rPr lang="en-US" altLang="zh-TW" sz="2400" dirty="0" smtClean="0"/>
+              <a:rPr lang="en-US" altLang="zh-TW" sz="2400" dirty="0"/>
               <a:t>, </a:t>
             </a:r>
             <a:r>
-              <a:rPr lang="en-US" altLang="zh-TW" sz="2400" dirty="0" err="1" smtClean="0"/>
+              <a:rPr lang="en-US" altLang="zh-TW" sz="2400" dirty="0" err="1"/>
               <a:t>gdb</a:t>
             </a:r>
             <a:r>
-              <a:rPr lang="en-US" altLang="zh-TW" sz="2400" dirty="0" smtClean="0"/>
+              <a:rPr lang="en-US" altLang="zh-TW" sz="2400" dirty="0"/>
               <a:t>, make</a:t>
             </a:r>
           </a:p>
@@ -6354,7 +6330,7 @@
               </a:lnSpc>
             </a:pPr>
             <a:r>
-              <a:rPr lang="en-US" altLang="zh-TW" sz="2400" dirty="0" smtClean="0"/>
+              <a:rPr lang="en-US" altLang="zh-TW" sz="2400" dirty="0"/>
               <a:t>your favorite X-window: KDE/Gnome</a:t>
             </a:r>
           </a:p>
@@ -6365,23 +6341,23 @@
               </a:lnSpc>
             </a:pPr>
             <a:r>
-              <a:rPr lang="en-US" altLang="zh-TW" sz="2400" dirty="0" smtClean="0"/>
+              <a:rPr lang="en-US" altLang="zh-TW" sz="2400" dirty="0"/>
               <a:t>your favorite GUI debugger (</a:t>
             </a:r>
             <a:r>
-              <a:rPr lang="en-US" altLang="zh-TW" sz="2400" dirty="0" err="1" smtClean="0"/>
+              <a:rPr lang="en-US" altLang="zh-TW" sz="2400" dirty="0" err="1"/>
               <a:t>ddd</a:t>
             </a:r>
             <a:r>
-              <a:rPr lang="en-US" altLang="zh-TW" sz="2400" dirty="0" smtClean="0"/>
+              <a:rPr lang="en-US" altLang="zh-TW" sz="2400" dirty="0"/>
               <a:t>, </a:t>
             </a:r>
             <a:r>
-              <a:rPr lang="en-US" altLang="zh-TW" sz="2400" dirty="0" err="1" smtClean="0"/>
+              <a:rPr lang="en-US" altLang="zh-TW" sz="2400" dirty="0" err="1"/>
               <a:t>kdbg</a:t>
             </a:r>
             <a:r>
-              <a:rPr lang="en-US" altLang="zh-TW" sz="2400" dirty="0" smtClean="0"/>
+              <a:rPr lang="en-US" altLang="zh-TW" sz="2400" dirty="0"/>
               <a:t>, etc.)</a:t>
             </a:r>
           </a:p>
@@ -6392,23 +6368,23 @@
               </a:lnSpc>
             </a:pPr>
             <a:r>
-              <a:rPr lang="en-US" altLang="zh-TW" sz="2400" dirty="0" smtClean="0"/>
+              <a:rPr lang="en-US" altLang="zh-TW" sz="2400" dirty="0"/>
               <a:t>your favorite text editor (</a:t>
             </a:r>
             <a:r>
-              <a:rPr lang="en-US" altLang="zh-TW" sz="2400" dirty="0" err="1" smtClean="0"/>
+              <a:rPr lang="en-US" altLang="zh-TW" sz="2400" dirty="0" err="1"/>
               <a:t>kwrite</a:t>
             </a:r>
             <a:r>
-              <a:rPr lang="en-US" altLang="zh-TW" sz="2400" dirty="0" smtClean="0"/>
+              <a:rPr lang="en-US" altLang="zh-TW" sz="2400" dirty="0"/>
               <a:t>, </a:t>
             </a:r>
             <a:r>
-              <a:rPr lang="en-US" altLang="zh-TW" sz="2400" dirty="0" err="1" smtClean="0"/>
+              <a:rPr lang="en-US" altLang="zh-TW" sz="2400" dirty="0" err="1"/>
               <a:t>emacs</a:t>
             </a:r>
             <a:r>
-              <a:rPr lang="en-US" altLang="zh-TW" sz="2400" dirty="0" smtClean="0"/>
+              <a:rPr lang="en-US" altLang="zh-TW" sz="2400" dirty="0"/>
               <a:t>, vi, etc.)</a:t>
             </a:r>
           </a:p>
@@ -6419,13 +6395,6 @@
   <p:clrMapOvr>
     <a:masterClrMapping/>
   </p:clrMapOvr>
-  <p:timing>
-    <p:tnLst>
-      <p:par>
-        <p:cTn id="1" dur="indefinite" restart="never" nodeType="tmRoot"/>
-      </p:par>
-    </p:tnLst>
-  </p:timing>
 </p:sld>
 </file>
 
@@ -6463,7 +6432,7 @@
           <a:p>
             <a:pPr eaLnBrk="1" hangingPunct="1"/>
             <a:r>
-              <a:rPr lang="en-US" altLang="zh-TW" smtClean="0"/>
+              <a:rPr lang="en-US" altLang="zh-TW"/>
               <a:t>First UNIX instruction you should learn</a:t>
             </a:r>
           </a:p>
@@ -6486,61 +6455,61 @@
           <a:p>
             <a:pPr eaLnBrk="1" hangingPunct="1"/>
             <a:r>
-              <a:rPr lang="en-US" altLang="zh-TW" sz="2800" smtClean="0"/>
+              <a:rPr lang="en-US" altLang="zh-TW" sz="2800"/>
               <a:t>man</a:t>
             </a:r>
           </a:p>
           <a:p>
             <a:pPr lvl="1" eaLnBrk="1" hangingPunct="1"/>
             <a:r>
-              <a:rPr lang="en-US" altLang="zh-TW" sz="2400" smtClean="0"/>
+              <a:rPr lang="en-US" altLang="zh-TW" sz="2400"/>
               <a:t>“man </a:t>
             </a:r>
             <a:r>
-              <a:rPr lang="en-US" altLang="zh-TW" sz="2400" i="1" smtClean="0"/>
+              <a:rPr lang="en-US" altLang="zh-TW" sz="2400" i="1"/>
               <a:t>command” </a:t>
             </a:r>
             <a:r>
-              <a:rPr lang="en-US" altLang="zh-TW" sz="2400" smtClean="0"/>
+              <a:rPr lang="en-US" altLang="zh-TW" sz="2400"/>
               <a:t>to look for how to use certain command</a:t>
             </a:r>
           </a:p>
           <a:p>
             <a:pPr lvl="2" eaLnBrk="1" hangingPunct="1"/>
             <a:r>
-              <a:rPr lang="en-US" altLang="zh-TW" sz="2000" smtClean="0"/>
+              <a:rPr lang="en-US" altLang="zh-TW" sz="2000"/>
               <a:t>Example: “man gcc”</a:t>
             </a:r>
           </a:p>
           <a:p>
             <a:pPr lvl="1" eaLnBrk="1" hangingPunct="1"/>
             <a:r>
-              <a:rPr lang="en-US" altLang="zh-TW" sz="2400" smtClean="0"/>
+              <a:rPr lang="en-US" altLang="zh-TW" sz="2400"/>
               <a:t>man –k </a:t>
             </a:r>
             <a:r>
-              <a:rPr lang="en-US" altLang="zh-TW" sz="2400" i="1" smtClean="0"/>
+              <a:rPr lang="en-US" altLang="zh-TW" sz="2400" i="1"/>
               <a:t>keyword</a:t>
             </a:r>
           </a:p>
           <a:p>
             <a:pPr lvl="2" eaLnBrk="1" hangingPunct="1"/>
             <a:r>
-              <a:rPr lang="en-US" altLang="zh-TW" sz="2000" smtClean="0"/>
+              <a:rPr lang="en-US" altLang="zh-TW" sz="2000"/>
               <a:t>Example: “man –k compiler” to search for compilers installed on your system</a:t>
             </a:r>
           </a:p>
           <a:p>
             <a:pPr eaLnBrk="1" hangingPunct="1"/>
             <a:r>
-              <a:rPr lang="en-US" altLang="zh-TW" sz="2800" smtClean="0"/>
+              <a:rPr lang="en-US" altLang="zh-TW" sz="2800"/>
               <a:t>info</a:t>
             </a:r>
           </a:p>
           <a:p>
             <a:pPr lvl="1" eaLnBrk="1" hangingPunct="1"/>
             <a:r>
-              <a:rPr lang="en-US" altLang="zh-TW" sz="2400" smtClean="0"/>
+              <a:rPr lang="en-US" altLang="zh-TW" sz="2400"/>
               <a:t>Example: “info gcc” for detailed manual of gcc compiler</a:t>
             </a:r>
           </a:p>
@@ -6551,13 +6520,6 @@
   <p:clrMapOvr>
     <a:masterClrMapping/>
   </p:clrMapOvr>
-  <p:timing>
-    <p:tnLst>
-      <p:par>
-        <p:cTn id="1" dur="indefinite" restart="never" nodeType="tmRoot"/>
-      </p:par>
-    </p:tnLst>
-  </p:timing>
 </p:sld>
 </file>
 
@@ -6595,7 +6557,7 @@
           <a:p>
             <a:pPr eaLnBrk="1" hangingPunct="1"/>
             <a:r>
-              <a:rPr lang="en-US" altLang="zh-TW" smtClean="0"/>
+              <a:rPr lang="en-US" altLang="zh-TW"/>
               <a:t>Next Lecture</a:t>
             </a:r>
           </a:p>
@@ -6622,7 +6584,7 @@
               </a:lnSpc>
             </a:pPr>
             <a:r>
-              <a:rPr lang="en-US" altLang="zh-TW" sz="2800" smtClean="0"/>
+              <a:rPr lang="en-US" altLang="zh-TW" sz="2800"/>
               <a:t>basic UNIX administration</a:t>
             </a:r>
           </a:p>
@@ -6633,7 +6595,7 @@
               </a:lnSpc>
             </a:pPr>
             <a:r>
-              <a:rPr lang="en-US" altLang="zh-TW" sz="2400" smtClean="0"/>
+              <a:rPr lang="en-US" altLang="zh-TW" sz="2400"/>
               <a:t>frequently used shell commands</a:t>
             </a:r>
           </a:p>
@@ -6644,7 +6606,7 @@
               </a:lnSpc>
             </a:pPr>
             <a:r>
-              <a:rPr lang="en-US" altLang="zh-TW" sz="2400" smtClean="0"/>
+              <a:rPr lang="en-US" altLang="zh-TW" sz="2400"/>
               <a:t>basic shell programming</a:t>
             </a:r>
           </a:p>
@@ -6655,7 +6617,7 @@
               </a:lnSpc>
             </a:pPr>
             <a:r>
-              <a:rPr lang="en-US" altLang="zh-TW" sz="2400" smtClean="0"/>
+              <a:rPr lang="en-US" altLang="zh-TW" sz="2400"/>
               <a:t>environment setup</a:t>
             </a:r>
           </a:p>
@@ -6665,7 +6627,7 @@
                 <a:spcPct val="90000"/>
               </a:lnSpc>
             </a:pPr>
-            <a:endParaRPr lang="en-US" altLang="zh-TW" sz="2800" smtClean="0"/>
+            <a:endParaRPr lang="en-US" altLang="zh-TW" sz="2800"/>
           </a:p>
           <a:p>
             <a:pPr eaLnBrk="1" hangingPunct="1">
@@ -6674,7 +6636,7 @@
               </a:lnSpc>
             </a:pPr>
             <a:r>
-              <a:rPr lang="en-US" altLang="zh-TW" sz="2800" smtClean="0"/>
+              <a:rPr lang="en-US" altLang="zh-TW" sz="2800"/>
               <a:t>How to write a program on UNIX</a:t>
             </a:r>
           </a:p>
@@ -6685,7 +6647,7 @@
               </a:lnSpc>
             </a:pPr>
             <a:r>
-              <a:rPr lang="en-US" altLang="zh-TW" sz="2400" smtClean="0"/>
+              <a:rPr lang="en-US" altLang="zh-TW" sz="2400"/>
               <a:t>compile</a:t>
             </a:r>
           </a:p>
@@ -6696,7 +6658,7 @@
               </a:lnSpc>
             </a:pPr>
             <a:r>
-              <a:rPr lang="en-US" altLang="zh-TW" sz="2400" smtClean="0"/>
+              <a:rPr lang="en-US" altLang="zh-TW" sz="2400"/>
               <a:t>debug</a:t>
             </a:r>
           </a:p>
@@ -6707,7 +6669,7 @@
               </a:lnSpc>
             </a:pPr>
             <a:r>
-              <a:rPr lang="en-US" altLang="zh-TW" sz="2400" smtClean="0"/>
+              <a:rPr lang="en-US" altLang="zh-TW" sz="2400"/>
               <a:t>make</a:t>
             </a:r>
           </a:p>
@@ -6718,13 +6680,6 @@
   <p:clrMapOvr>
     <a:masterClrMapping/>
   </p:clrMapOvr>
-  <p:timing>
-    <p:tnLst>
-      <p:par>
-        <p:cTn id="1" dur="indefinite" restart="never" nodeType="tmRoot"/>
-      </p:par>
-    </p:tnLst>
-  </p:timing>
 </p:sld>
 </file>
 
@@ -6762,7 +6717,7 @@
           <a:p>
             <a:pPr eaLnBrk="1" hangingPunct="1"/>
             <a:r>
-              <a:rPr lang="en-US" altLang="zh-TW" smtClean="0"/>
+              <a:rPr lang="en-US" altLang="zh-TW"/>
               <a:t>How to get course data</a:t>
             </a:r>
           </a:p>
@@ -6789,7 +6744,7 @@
           <a:lstStyle/>
           <a:p>
             <a:pPr eaLnBrk="1" hangingPunct="1"/>
-            <a:endParaRPr lang="en-US" altLang="zh-TW" sz="2800" dirty="0" smtClean="0"/>
+            <a:endParaRPr lang="en-US" altLang="zh-TW" sz="2800" dirty="0"/>
           </a:p>
           <a:p>
             <a:pPr eaLnBrk="1" hangingPunct="1"/>
@@ -6801,16 +6756,10 @@
               <a:rPr lang="en-US" altLang="zh-TW" sz="2800" dirty="0">
                 <a:hlinkClick r:id="rId2"/>
               </a:rPr>
-              <a:t>https://</a:t>
-            </a:r>
-            <a:r>
-              <a:rPr lang="en-US" altLang="zh-TW" sz="2800" dirty="0" smtClean="0">
-                <a:hlinkClick r:id="rId2"/>
-              </a:rPr>
-              <a:t>github.com/CGUSystemCourses/Unix-2018</a:t>
-            </a:r>
-            <a:r>
-              <a:rPr lang="en-US" altLang="zh-TW" sz="2800" dirty="0" smtClean="0"/>
+              <a:t>https://github.com/CGUSystemCourses/Unix-2018</a:t>
+            </a:r>
+            <a:r>
+              <a:rPr lang="en-US" altLang="zh-TW" sz="2800" dirty="0"/>
               <a:t> </a:t>
             </a:r>
           </a:p>
@@ -6821,13 +6770,6 @@
   <p:clrMapOvr>
     <a:masterClrMapping/>
   </p:clrMapOvr>
-  <p:timing>
-    <p:tnLst>
-      <p:par>
-        <p:cTn id="1" dur="indefinite" restart="never" nodeType="tmRoot"/>
-      </p:par>
-    </p:tnLst>
-  </p:timing>
 </p:sld>
 </file>
 
@@ -6865,7 +6807,7 @@
           <a:p>
             <a:pPr eaLnBrk="1" hangingPunct="1"/>
             <a:r>
-              <a:rPr lang="en-US" altLang="zh-TW" smtClean="0"/>
+              <a:rPr lang="en-US" altLang="zh-TW"/>
               <a:t>Textbooks</a:t>
             </a:r>
           </a:p>
@@ -6897,152 +6839,24 @@
               </a:lnSpc>
             </a:pPr>
             <a:r>
-              <a:rPr lang="en-US" altLang="zh-TW" sz="2000" dirty="0" smtClean="0"/>
+              <a:rPr lang="en-US" altLang="zh-TW" sz="2000" dirty="0"/>
               <a:t>W. R. Stevens and S. A. </a:t>
             </a:r>
             <a:r>
-              <a:rPr lang="en-US" altLang="zh-TW" sz="2000" dirty="0" err="1" smtClean="0"/>
+              <a:rPr lang="en-US" altLang="zh-TW" sz="2000" dirty="0" err="1"/>
               <a:t>Rago</a:t>
             </a:r>
             <a:r>
-              <a:rPr lang="en-US" altLang="zh-TW" sz="2000" dirty="0" smtClean="0"/>
+              <a:rPr lang="en-US" altLang="zh-TW" sz="2000" dirty="0"/>
               <a:t>, </a:t>
             </a:r>
             <a:r>
-              <a:rPr lang="en-US" altLang="zh-TW" sz="2000" i="1" dirty="0" smtClean="0"/>
+              <a:rPr lang="en-US" altLang="zh-TW" sz="2000" i="1" dirty="0"/>
               <a:t>Advanced Programming in the UNIX Environment</a:t>
             </a:r>
             <a:r>
-              <a:rPr lang="en-US" altLang="zh-TW" sz="2000" dirty="0" smtClean="0"/>
+              <a:rPr lang="en-US" altLang="zh-TW" sz="2000" dirty="0"/>
               <a:t>, 2ed, Addison Wesley 2005</a:t>
-            </a:r>
-          </a:p>
-          <a:p>
-            <a:pPr eaLnBrk="1" hangingPunct="1">
-              <a:lnSpc>
-                <a:spcPct val="80000"/>
-              </a:lnSpc>
-            </a:pPr>
-            <a:endParaRPr lang="en-US" altLang="zh-TW" sz="2000" dirty="0" smtClean="0"/>
-          </a:p>
-          <a:p>
-            <a:pPr eaLnBrk="1" hangingPunct="1">
-              <a:lnSpc>
-                <a:spcPct val="80000"/>
-              </a:lnSpc>
-            </a:pPr>
-            <a:r>
-              <a:rPr lang="en-US" altLang="zh-TW" sz="2000" dirty="0" smtClean="0"/>
-              <a:t>A. </a:t>
-            </a:r>
-            <a:r>
-              <a:rPr lang="en-US" altLang="zh-TW" sz="2000" dirty="0" err="1" smtClean="0"/>
-              <a:t>Silberschatz</a:t>
-            </a:r>
-            <a:r>
-              <a:rPr lang="en-US" altLang="zh-TW" sz="2000" dirty="0" smtClean="0"/>
-              <a:t>, P. B. Galvin, and G. Gagne, “Operating System Principles,” 7/e, Jon </a:t>
-            </a:r>
-            <a:r>
-              <a:rPr lang="en-US" altLang="zh-TW" sz="2000" dirty="0" err="1" smtClean="0"/>
-              <a:t>Wilely</a:t>
-            </a:r>
-            <a:r>
-              <a:rPr lang="en-US" altLang="zh-TW" sz="2000" dirty="0" smtClean="0"/>
-              <a:t> &amp; Sons, 2006</a:t>
-            </a:r>
-          </a:p>
-          <a:p>
-            <a:pPr lvl="1" eaLnBrk="1" hangingPunct="1">
-              <a:lnSpc>
-                <a:spcPct val="80000"/>
-              </a:lnSpc>
-            </a:pPr>
-            <a:r>
-              <a:rPr lang="en-US" altLang="zh-TW" sz="1800" dirty="0" smtClean="0">
-                <a:solidFill>
-                  <a:schemeClr val="hlink"/>
-                </a:solidFill>
-              </a:rPr>
-              <a:t>your OS textbook!</a:t>
-            </a:r>
-          </a:p>
-          <a:p>
-            <a:pPr lvl="1" eaLnBrk="1" hangingPunct="1">
-              <a:lnSpc>
-                <a:spcPct val="80000"/>
-              </a:lnSpc>
-            </a:pPr>
-            <a:endParaRPr lang="en-US" altLang="zh-TW" sz="2000" dirty="0" smtClean="0"/>
-          </a:p>
-          <a:p>
-            <a:pPr eaLnBrk="1" hangingPunct="1">
-              <a:lnSpc>
-                <a:spcPct val="80000"/>
-              </a:lnSpc>
-            </a:pPr>
-            <a:r>
-              <a:rPr lang="en-US" altLang="zh-TW" sz="2000" dirty="0" smtClean="0"/>
-              <a:t>Michael </a:t>
-            </a:r>
-            <a:r>
-              <a:rPr lang="en-US" altLang="zh-TW" sz="2000" dirty="0" err="1" smtClean="0"/>
-              <a:t>Kerrisk</a:t>
-            </a:r>
-            <a:r>
-              <a:rPr lang="en-US" altLang="zh-TW" sz="2000" dirty="0" smtClean="0"/>
-              <a:t>, </a:t>
-            </a:r>
-            <a:r>
-              <a:rPr lang="en-US" altLang="zh-TW" sz="2000" i="1" dirty="0" smtClean="0"/>
-              <a:t>Linux Programming Interface: A Linux and Unix System Programming Handbook</a:t>
-            </a:r>
-            <a:r>
-              <a:rPr lang="en-US" altLang="zh-TW" sz="2000" dirty="0" smtClean="0"/>
-              <a:t>, No Starch Press, 2011.</a:t>
-            </a:r>
-          </a:p>
-          <a:p>
-            <a:pPr eaLnBrk="1" hangingPunct="1">
-              <a:lnSpc>
-                <a:spcPct val="80000"/>
-              </a:lnSpc>
-            </a:pPr>
-            <a:endParaRPr lang="en-US" altLang="zh-TW" sz="2000" dirty="0" smtClean="0"/>
-          </a:p>
-          <a:p>
-            <a:pPr eaLnBrk="1" hangingPunct="1">
-              <a:lnSpc>
-                <a:spcPct val="80000"/>
-              </a:lnSpc>
-            </a:pPr>
-            <a:r>
-              <a:rPr lang="en-US" altLang="zh-TW" sz="2000" dirty="0"/>
-              <a:t>Brian Ward, </a:t>
-            </a:r>
-            <a:r>
-              <a:rPr lang="en-US" altLang="zh-TW" sz="2000" i="1" dirty="0"/>
-              <a:t>How Linux </a:t>
-            </a:r>
-            <a:r>
-              <a:rPr lang="en-US" altLang="zh-TW" sz="2000" i="1" dirty="0" smtClean="0"/>
-              <a:t>Works: </a:t>
-            </a:r>
-            <a:r>
-              <a:rPr lang="en-US" altLang="zh-TW" sz="2000" i="1" dirty="0"/>
-              <a:t>What Every </a:t>
-            </a:r>
-            <a:r>
-              <a:rPr lang="en-US" altLang="zh-TW" sz="2000" i="1" dirty="0" err="1"/>
-              <a:t>Superuser</a:t>
-            </a:r>
-            <a:r>
-              <a:rPr lang="en-US" altLang="zh-TW" sz="2000" i="1" dirty="0"/>
-              <a:t> Should </a:t>
-            </a:r>
-            <a:r>
-              <a:rPr lang="en-US" altLang="zh-TW" sz="2000" i="1" dirty="0" smtClean="0"/>
-              <a:t>Know</a:t>
             </a:r>
           </a:p>
           <a:p>
@@ -7060,7 +6874,123 @@
               </a:lnSpc>
             </a:pPr>
             <a:r>
-              <a:rPr lang="en-US" altLang="zh-TW" sz="2000" dirty="0" smtClean="0"/>
+              <a:rPr lang="en-US" altLang="zh-TW" sz="2000" dirty="0"/>
+              <a:t>A. </a:t>
+            </a:r>
+            <a:r>
+              <a:rPr lang="en-US" altLang="zh-TW" sz="2000" dirty="0" err="1"/>
+              <a:t>Silberschatz</a:t>
+            </a:r>
+            <a:r>
+              <a:rPr lang="en-US" altLang="zh-TW" sz="2000" dirty="0"/>
+              <a:t>, P. B. Galvin, and G. Gagne, “Operating System Principles,” 7/e, Jon </a:t>
+            </a:r>
+            <a:r>
+              <a:rPr lang="en-US" altLang="zh-TW" sz="2000" dirty="0" err="1"/>
+              <a:t>Wilely</a:t>
+            </a:r>
+            <a:r>
+              <a:rPr lang="en-US" altLang="zh-TW" sz="2000" dirty="0"/>
+              <a:t> &amp; Sons, 2006</a:t>
+            </a:r>
+          </a:p>
+          <a:p>
+            <a:pPr lvl="1" eaLnBrk="1" hangingPunct="1">
+              <a:lnSpc>
+                <a:spcPct val="80000"/>
+              </a:lnSpc>
+            </a:pPr>
+            <a:r>
+              <a:rPr lang="en-US" altLang="zh-TW" sz="1800" dirty="0">
+                <a:solidFill>
+                  <a:schemeClr val="hlink"/>
+                </a:solidFill>
+              </a:rPr>
+              <a:t>your OS textbook!</a:t>
+            </a:r>
+          </a:p>
+          <a:p>
+            <a:pPr lvl="1" eaLnBrk="1" hangingPunct="1">
+              <a:lnSpc>
+                <a:spcPct val="80000"/>
+              </a:lnSpc>
+            </a:pPr>
+            <a:endParaRPr lang="en-US" altLang="zh-TW" sz="2000" dirty="0"/>
+          </a:p>
+          <a:p>
+            <a:pPr eaLnBrk="1" hangingPunct="1">
+              <a:lnSpc>
+                <a:spcPct val="80000"/>
+              </a:lnSpc>
+            </a:pPr>
+            <a:r>
+              <a:rPr lang="en-US" altLang="zh-TW" sz="2000" dirty="0"/>
+              <a:t>Michael </a:t>
+            </a:r>
+            <a:r>
+              <a:rPr lang="en-US" altLang="zh-TW" sz="2000" dirty="0" err="1"/>
+              <a:t>Kerrisk</a:t>
+            </a:r>
+            <a:r>
+              <a:rPr lang="en-US" altLang="zh-TW" sz="2000" dirty="0"/>
+              <a:t>, </a:t>
+            </a:r>
+            <a:r>
+              <a:rPr lang="en-US" altLang="zh-TW" sz="2000" i="1" dirty="0"/>
+              <a:t>Linux Programming Interface: A Linux and Unix System Programming Handbook</a:t>
+            </a:r>
+            <a:r>
+              <a:rPr lang="en-US" altLang="zh-TW" sz="2000" dirty="0"/>
+              <a:t>, No Starch Press, 2011.</a:t>
+            </a:r>
+          </a:p>
+          <a:p>
+            <a:pPr eaLnBrk="1" hangingPunct="1">
+              <a:lnSpc>
+                <a:spcPct val="80000"/>
+              </a:lnSpc>
+            </a:pPr>
+            <a:endParaRPr lang="en-US" altLang="zh-TW" sz="2000" dirty="0"/>
+          </a:p>
+          <a:p>
+            <a:pPr eaLnBrk="1" hangingPunct="1">
+              <a:lnSpc>
+                <a:spcPct val="80000"/>
+              </a:lnSpc>
+            </a:pPr>
+            <a:r>
+              <a:rPr lang="en-US" altLang="zh-TW" sz="2000" dirty="0"/>
+              <a:t>Brian Ward, </a:t>
+            </a:r>
+            <a:r>
+              <a:rPr lang="en-US" altLang="zh-TW" sz="2000" i="1" dirty="0"/>
+              <a:t>How Linux Works: What Every </a:t>
+            </a:r>
+            <a:r>
+              <a:rPr lang="en-US" altLang="zh-TW" sz="2000" i="1" dirty="0" err="1"/>
+              <a:t>Superuser</a:t>
+            </a:r>
+            <a:r>
+              <a:rPr lang="en-US" altLang="zh-TW" sz="2000" i="1" dirty="0"/>
+              <a:t> Should Know</a:t>
+            </a:r>
+          </a:p>
+          <a:p>
+            <a:pPr eaLnBrk="1" hangingPunct="1">
+              <a:lnSpc>
+                <a:spcPct val="80000"/>
+              </a:lnSpc>
+            </a:pPr>
+            <a:endParaRPr lang="en-US" altLang="zh-TW" sz="2000" dirty="0"/>
+          </a:p>
+          <a:p>
+            <a:pPr eaLnBrk="1" hangingPunct="1">
+              <a:lnSpc>
+                <a:spcPct val="80000"/>
+              </a:lnSpc>
+            </a:pPr>
+            <a:r>
+              <a:rPr lang="en-US" altLang="zh-TW" sz="2000" dirty="0"/>
               <a:t>“man” and “info” of UNIX</a:t>
             </a:r>
           </a:p>
@@ -7071,13 +7001,6 @@
   <p:clrMapOvr>
     <a:masterClrMapping/>
   </p:clrMapOvr>
-  <p:timing>
-    <p:tnLst>
-      <p:par>
-        <p:cTn id="1" dur="indefinite" restart="never" nodeType="tmRoot"/>
-      </p:par>
-    </p:tnLst>
-  </p:timing>
 </p:sld>
 </file>
 
@@ -7115,7 +7038,7 @@
           <a:p>
             <a:pPr eaLnBrk="1" hangingPunct="1"/>
             <a:r>
-              <a:rPr lang="en-US" altLang="zh-TW" smtClean="0"/>
+              <a:rPr lang="en-US" altLang="zh-TW"/>
               <a:t>Grading</a:t>
             </a:r>
           </a:p>
@@ -7138,7 +7061,7 @@
           <a:p>
             <a:pPr eaLnBrk="1" hangingPunct="1"/>
             <a:r>
-              <a:rPr lang="en-US" altLang="zh-TW" dirty="0" smtClean="0"/>
+              <a:rPr lang="en-US" altLang="zh-TW" dirty="0"/>
               <a:t>Homework: 70%</a:t>
             </a:r>
           </a:p>
@@ -7146,38 +7069,34 @@
             <a:pPr lvl="1" eaLnBrk="1" hangingPunct="1"/>
             <a:r>
               <a:rPr lang="en-US" altLang="zh-TW" dirty="0"/>
-              <a:t>5</a:t>
-            </a:r>
-            <a:r>
-              <a:rPr lang="en-US" altLang="zh-TW" dirty="0" smtClean="0"/>
-              <a:t> program assignments expected</a:t>
+              <a:t>5 program assignments expected</a:t>
             </a:r>
           </a:p>
           <a:p>
             <a:pPr lvl="1" eaLnBrk="1" hangingPunct="1"/>
             <a:r>
-              <a:rPr lang="en-US" altLang="zh-TW" dirty="0" smtClean="0"/>
+              <a:rPr lang="en-US" altLang="zh-TW" dirty="0"/>
               <a:t>e.g. shell, parallel matrix multiplication</a:t>
             </a:r>
           </a:p>
           <a:p>
             <a:pPr eaLnBrk="1" hangingPunct="1"/>
             <a:r>
-              <a:rPr lang="en-US" altLang="zh-TW" dirty="0" smtClean="0"/>
+              <a:rPr lang="en-US" altLang="zh-TW" dirty="0"/>
               <a:t>Project: 30%</a:t>
             </a:r>
           </a:p>
           <a:p>
             <a:pPr lvl="1" eaLnBrk="1" hangingPunct="1"/>
             <a:r>
-              <a:rPr lang="en-US" altLang="zh-TW" dirty="0" smtClean="0"/>
+              <a:rPr lang="en-US" altLang="zh-TW" dirty="0"/>
               <a:t>do what you feel interested</a:t>
             </a:r>
           </a:p>
           <a:p>
             <a:pPr lvl="1" eaLnBrk="1" hangingPunct="1"/>
             <a:r>
-              <a:rPr lang="en-US" altLang="zh-TW" dirty="0" smtClean="0"/>
+              <a:rPr lang="en-US" altLang="zh-TW" dirty="0"/>
               <a:t>e.g. network messenger like MSN</a:t>
             </a:r>
           </a:p>
@@ -7188,13 +7107,6 @@
   <p:clrMapOvr>
     <a:masterClrMapping/>
   </p:clrMapOvr>
-  <p:timing>
-    <p:tnLst>
-      <p:par>
-        <p:cTn id="1" dur="indefinite" restart="never" nodeType="tmRoot"/>
-      </p:par>
-    </p:tnLst>
-  </p:timing>
 </p:sld>
 </file>
 
@@ -7232,7 +7144,7 @@
           <a:p>
             <a:pPr eaLnBrk="1" hangingPunct="1"/>
             <a:r>
-              <a:rPr lang="en-US" altLang="zh-TW" smtClean="0"/>
+              <a:rPr lang="en-US" altLang="zh-TW"/>
               <a:t>Experiment Environment</a:t>
             </a:r>
           </a:p>
@@ -7255,50 +7167,50 @@
           <a:p>
             <a:pPr eaLnBrk="1" hangingPunct="1"/>
             <a:r>
-              <a:rPr lang="en-US" altLang="zh-TW" dirty="0" smtClean="0"/>
-              <a:t>Fedora Core or Ubuntu</a:t>
+              <a:rPr lang="en-US" altLang="zh-TW" dirty="0"/>
+              <a:t>Fedora/Ubuntu/Red Hat Enterprise/CentOS</a:t>
             </a:r>
           </a:p>
           <a:p>
             <a:pPr lvl="1" eaLnBrk="1" hangingPunct="1"/>
             <a:r>
-              <a:rPr lang="en-US" altLang="zh-TW" dirty="0" smtClean="0"/>
+              <a:rPr lang="en-US" altLang="zh-TW" dirty="0"/>
               <a:t>the CSIE server: Ubuntu</a:t>
             </a:r>
           </a:p>
           <a:p>
             <a:pPr lvl="1" eaLnBrk="1" hangingPunct="1"/>
             <a:r>
-              <a:rPr lang="en-US" altLang="zh-TW" dirty="0" smtClean="0"/>
-              <a:t>my laptop: Fedora Core 20</a:t>
+              <a:rPr lang="en-US" altLang="zh-TW" dirty="0"/>
+              <a:t>my laptop: RHEL-7</a:t>
             </a:r>
           </a:p>
           <a:p>
             <a:pPr eaLnBrk="1" hangingPunct="1"/>
             <a:r>
-              <a:rPr lang="en-US" altLang="zh-TW" dirty="0" smtClean="0"/>
+              <a:rPr lang="en-US" altLang="zh-TW" dirty="0"/>
               <a:t>with GNU tool-chain</a:t>
             </a:r>
           </a:p>
           <a:p>
             <a:pPr lvl="1" eaLnBrk="1" hangingPunct="1"/>
             <a:r>
-              <a:rPr lang="en-US" altLang="zh-TW" dirty="0" err="1" smtClean="0"/>
+              <a:rPr lang="en-US" altLang="zh-TW" dirty="0" err="1"/>
               <a:t>gcc</a:t>
             </a:r>
             <a:r>
-              <a:rPr lang="en-US" altLang="zh-TW" dirty="0" smtClean="0"/>
+              <a:rPr lang="en-US" altLang="zh-TW" dirty="0"/>
               <a:t> (the C compiler)</a:t>
             </a:r>
           </a:p>
           <a:p>
             <a:pPr lvl="1" eaLnBrk="1" hangingPunct="1"/>
             <a:r>
-              <a:rPr lang="en-US" altLang="zh-TW" dirty="0" err="1" smtClean="0"/>
+              <a:rPr lang="en-US" altLang="zh-TW" dirty="0" err="1"/>
               <a:t>gdb</a:t>
             </a:r>
             <a:r>
-              <a:rPr lang="en-US" altLang="zh-TW" dirty="0" smtClean="0"/>
+              <a:rPr lang="en-US" altLang="zh-TW" dirty="0"/>
               <a:t> (the GNU debugger)</a:t>
             </a:r>
           </a:p>
@@ -7309,13 +7221,6 @@
   <p:clrMapOvr>
     <a:masterClrMapping/>
   </p:clrMapOvr>
-  <p:timing>
-    <p:tnLst>
-      <p:par>
-        <p:cTn id="1" dur="indefinite" restart="never" nodeType="tmRoot"/>
-      </p:par>
-    </p:tnLst>
-  </p:timing>
 </p:sld>
 </file>
 
@@ -7353,7 +7258,7 @@
           <a:p>
             <a:pPr eaLnBrk="1" hangingPunct="1"/>
             <a:r>
-              <a:rPr lang="en-US" altLang="zh-TW" smtClean="0"/>
+              <a:rPr lang="en-US" altLang="zh-TW"/>
               <a:t>Content of this Course</a:t>
             </a:r>
           </a:p>
@@ -7375,7 +7280,7 @@
           <a:lstStyle/>
           <a:p>
             <a:pPr eaLnBrk="1" hangingPunct="1"/>
-            <a:endParaRPr lang="zh-TW" altLang="en-US" smtClean="0"/>
+            <a:endParaRPr lang="zh-TW" altLang="en-US"/>
           </a:p>
         </p:txBody>
       </p:sp>
@@ -7384,13 +7289,6 @@
   <p:clrMapOvr>
     <a:masterClrMapping/>
   </p:clrMapOvr>
-  <p:timing>
-    <p:tnLst>
-      <p:par>
-        <p:cTn id="1" dur="indefinite" restart="never" nodeType="tmRoot"/>
-      </p:par>
-    </p:tnLst>
-  </p:timing>
 </p:sld>
 </file>
 
@@ -7428,7 +7326,7 @@
           <a:p>
             <a:pPr eaLnBrk="1" hangingPunct="1"/>
             <a:r>
-              <a:rPr lang="en-US" altLang="zh-TW" smtClean="0"/>
+              <a:rPr lang="en-US" altLang="zh-TW"/>
               <a:t>Why learning UNIX?</a:t>
             </a:r>
           </a:p>
@@ -7455,7 +7353,7 @@
               </a:lnSpc>
             </a:pPr>
             <a:r>
-              <a:rPr lang="en-US" altLang="zh-TW" smtClean="0"/>
+              <a:rPr lang="en-US" altLang="zh-TW"/>
               <a:t>academic research</a:t>
             </a:r>
           </a:p>
@@ -7466,7 +7364,7 @@
               </a:lnSpc>
             </a:pPr>
             <a:r>
-              <a:rPr lang="en-US" altLang="zh-TW" smtClean="0"/>
+              <a:rPr lang="en-US" altLang="zh-TW"/>
               <a:t>lots of open-source free software</a:t>
             </a:r>
           </a:p>
@@ -7477,7 +7375,7 @@
               </a:lnSpc>
             </a:pPr>
             <a:r>
-              <a:rPr lang="en-US" altLang="zh-TW" smtClean="0"/>
+              <a:rPr lang="en-US" altLang="zh-TW"/>
               <a:t>innovative software appears on UNIX first</a:t>
             </a:r>
           </a:p>
@@ -7488,7 +7386,7 @@
               </a:lnSpc>
             </a:pPr>
             <a:r>
-              <a:rPr lang="en-US" altLang="zh-TW" smtClean="0"/>
+              <a:rPr lang="en-US" altLang="zh-TW"/>
               <a:t>network computing research (cluster/grid)</a:t>
             </a:r>
           </a:p>
@@ -7499,7 +7397,7 @@
               </a:lnSpc>
             </a:pPr>
             <a:r>
-              <a:rPr lang="en-US" altLang="zh-TW" smtClean="0"/>
+              <a:rPr lang="en-US" altLang="zh-TW"/>
               <a:t>embedded system and SoC (system-on-chip)</a:t>
             </a:r>
           </a:p>
@@ -7510,7 +7408,7 @@
               </a:lnSpc>
             </a:pPr>
             <a:r>
-              <a:rPr lang="en-US" altLang="zh-TW" smtClean="0"/>
+              <a:rPr lang="en-US" altLang="zh-TW"/>
               <a:t>most of embedded software are Linux-based</a:t>
             </a:r>
           </a:p>
@@ -7521,7 +7419,7 @@
               </a:lnSpc>
             </a:pPr>
             <a:r>
-              <a:rPr lang="en-US" altLang="zh-TW" smtClean="0">
+              <a:rPr lang="en-US" altLang="zh-TW">
                 <a:solidFill>
                   <a:schemeClr val="hlink"/>
                 </a:solidFill>
@@ -7536,13 +7434,6 @@
   <p:clrMapOvr>
     <a:masterClrMapping/>
   </p:clrMapOvr>
-  <p:timing>
-    <p:tnLst>
-      <p:par>
-        <p:cTn id="1" dur="indefinite" restart="never" nodeType="tmRoot"/>
-      </p:par>
-    </p:tnLst>
-  </p:timing>
 </p:sld>
 </file>
 
@@ -7580,7 +7471,7 @@
           <a:p>
             <a:pPr eaLnBrk="1" hangingPunct="1"/>
             <a:r>
-              <a:rPr lang="en-US" altLang="zh-TW" smtClean="0"/>
+              <a:rPr lang="en-US" altLang="zh-TW"/>
               <a:t>Topics Covered</a:t>
             </a:r>
           </a:p>
@@ -7603,49 +7494,49 @@
           <a:p>
             <a:pPr eaLnBrk="1" hangingPunct="1"/>
             <a:r>
-              <a:rPr lang="en-US" altLang="zh-TW" smtClean="0"/>
+              <a:rPr lang="en-US" altLang="zh-TW"/>
               <a:t>UNIX architecture</a:t>
             </a:r>
           </a:p>
           <a:p>
             <a:pPr eaLnBrk="1" hangingPunct="1"/>
             <a:r>
-              <a:rPr lang="en-US" altLang="zh-TW" smtClean="0"/>
+              <a:rPr lang="en-US" altLang="zh-TW"/>
               <a:t>File System Operations</a:t>
             </a:r>
           </a:p>
           <a:p>
             <a:pPr eaLnBrk="1" hangingPunct="1"/>
             <a:r>
-              <a:rPr lang="en-US" altLang="zh-TW" smtClean="0"/>
+              <a:rPr lang="en-US" altLang="zh-TW"/>
               <a:t>Terminal I/O</a:t>
             </a:r>
           </a:p>
           <a:p>
             <a:pPr eaLnBrk="1" hangingPunct="1"/>
             <a:r>
-              <a:rPr lang="en-US" altLang="zh-TW" smtClean="0"/>
+              <a:rPr lang="en-US" altLang="zh-TW"/>
               <a:t>Concurrent Programming</a:t>
             </a:r>
           </a:p>
           <a:p>
             <a:pPr lvl="1" eaLnBrk="1" hangingPunct="1"/>
             <a:r>
-              <a:rPr lang="en-US" altLang="zh-TW" smtClean="0"/>
+              <a:rPr lang="en-US" altLang="zh-TW"/>
               <a:t>process/thread, signals, semaphores, IPC, etc.</a:t>
             </a:r>
           </a:p>
           <a:p>
             <a:pPr eaLnBrk="1" hangingPunct="1"/>
             <a:r>
-              <a:rPr lang="en-US" altLang="zh-TW" smtClean="0"/>
+              <a:rPr lang="en-US" altLang="zh-TW"/>
               <a:t>Network Computing</a:t>
             </a:r>
           </a:p>
           <a:p>
             <a:pPr lvl="1" eaLnBrk="1" hangingPunct="1"/>
             <a:r>
-              <a:rPr lang="en-US" altLang="zh-TW" smtClean="0"/>
+              <a:rPr lang="en-US" altLang="zh-TW"/>
               <a:t>socket, RPC</a:t>
             </a:r>
           </a:p>
@@ -7656,13 +7547,6 @@
   <p:clrMapOvr>
     <a:masterClrMapping/>
   </p:clrMapOvr>
-  <p:timing>
-    <p:tnLst>
-      <p:par>
-        <p:cTn id="1" dur="indefinite" restart="never" nodeType="tmRoot"/>
-      </p:par>
-    </p:tnLst>
-  </p:timing>
 </p:sld>
 </file>
 
@@ -7700,7 +7584,7 @@
           <a:p>
             <a:pPr eaLnBrk="1" hangingPunct="1"/>
             <a:r>
-              <a:rPr lang="en-US" altLang="zh-TW" smtClean="0"/>
+              <a:rPr lang="en-US" altLang="zh-TW"/>
               <a:t>Your preparation for taking this course</a:t>
             </a:r>
           </a:p>
@@ -7722,7 +7606,7 @@
           <a:lstStyle/>
           <a:p>
             <a:pPr eaLnBrk="1" hangingPunct="1"/>
-            <a:endParaRPr lang="zh-TW" altLang="en-US" smtClean="0"/>
+            <a:endParaRPr lang="zh-TW" altLang="en-US"/>
           </a:p>
         </p:txBody>
       </p:sp>
@@ -7731,13 +7615,6 @@
   <p:clrMapOvr>
     <a:masterClrMapping/>
   </p:clrMapOvr>
-  <p:timing>
-    <p:tnLst>
-      <p:par>
-        <p:cTn id="1" dur="indefinite" restart="never" nodeType="tmRoot"/>
-      </p:par>
-    </p:tnLst>
-  </p:timing>
 </p:sld>
 </file>
 

</xml_diff>